<commit_message>
refactor : code function, main, presentation
</commit_message>
<xml_diff>
--- a/template.pptx
+++ b/template.pptx
@@ -303,7 +303,7 @@
                 <a:tabLst/>
                 <a:defRPr/>
               </a:pPr>
-              <a:t>20/03/2022</a:t>
+              <a:t>05/11/2023</a:t>
             </a:fld>
             <a:endParaRPr kumimoji="0" lang="fr-FR" sz="1200" b="0" i="0" u="none" strike="noStrike" kern="1200" cap="none" spc="0" normalizeH="0" baseline="0" noProof="0">
               <a:ln>
@@ -441,7 +441,7 @@
                 <a:tabLst/>
                 <a:defRPr/>
               </a:pPr>
-              <a:t>‹#›</a:t>
+              <a:t>‹N°›</a:t>
             </a:fld>
             <a:endParaRPr kumimoji="0" lang="fr-FR" sz="1200" b="0" i="0" u="none" strike="noStrike" kern="1200" cap="none" spc="0" normalizeH="0" baseline="0" noProof="0">
               <a:ln>
@@ -633,7 +633,7 @@
                 <a:tabLst/>
                 <a:defRPr/>
               </a:pPr>
-              <a:t>20/03/2022</a:t>
+              <a:t>05/11/2023</a:t>
             </a:fld>
             <a:endParaRPr kumimoji="0" lang="fr-FR" sz="1200" b="0" i="0" u="none" strike="noStrike" kern="1200" cap="none" spc="0" normalizeH="0" baseline="0" noProof="0">
               <a:ln>
@@ -771,7 +771,7 @@
                 <a:tabLst/>
                 <a:defRPr/>
               </a:pPr>
-              <a:t>‹#›</a:t>
+              <a:t>‹N°›</a:t>
             </a:fld>
             <a:endParaRPr kumimoji="0" lang="fr-FR" sz="1200" b="0" i="0" u="none" strike="noStrike" kern="1200" cap="none" spc="0" normalizeH="0" baseline="0" noProof="0">
               <a:ln>
@@ -973,7 +973,7 @@
                 <a:tabLst/>
                 <a:defRPr/>
               </a:pPr>
-              <a:t>20/03/2022</a:t>
+              <a:t>05/11/2023</a:t>
             </a:fld>
             <a:endParaRPr kumimoji="0" lang="fr-FR" sz="1200" b="0" i="0" u="none" strike="noStrike" kern="1200" cap="none" spc="0" normalizeH="0" baseline="0" noProof="0">
               <a:ln>
@@ -1111,7 +1111,7 @@
                 <a:tabLst/>
                 <a:defRPr/>
               </a:pPr>
-              <a:t>‹#›</a:t>
+              <a:t>‹N°›</a:t>
             </a:fld>
             <a:endParaRPr kumimoji="0" lang="fr-FR" sz="1200" b="0" i="0" u="none" strike="noStrike" kern="1200" cap="none" spc="0" normalizeH="0" baseline="0" noProof="0">
               <a:ln>
@@ -1303,7 +1303,7 @@
                 <a:tabLst/>
                 <a:defRPr/>
               </a:pPr>
-              <a:t>20/03/2022</a:t>
+              <a:t>05/11/2023</a:t>
             </a:fld>
             <a:endParaRPr kumimoji="0" lang="fr-FR" sz="1200" b="0" i="0" u="none" strike="noStrike" kern="1200" cap="none" spc="0" normalizeH="0" baseline="0" noProof="0">
               <a:ln>
@@ -1441,7 +1441,7 @@
                 <a:tabLst/>
                 <a:defRPr/>
               </a:pPr>
-              <a:t>‹#›</a:t>
+              <a:t>‹N°›</a:t>
             </a:fld>
             <a:endParaRPr kumimoji="0" lang="fr-FR" sz="1200" b="0" i="0" u="none" strike="noStrike" kern="1200" cap="none" spc="0" normalizeH="0" baseline="0" noProof="0">
               <a:ln>
@@ -1707,7 +1707,7 @@
                 <a:tabLst/>
                 <a:defRPr/>
               </a:pPr>
-              <a:t>20/03/2022</a:t>
+              <a:t>05/11/2023</a:t>
             </a:fld>
             <a:endParaRPr kumimoji="0" lang="fr-FR" sz="1200" b="0" i="0" u="none" strike="noStrike" kern="1200" cap="none" spc="0" normalizeH="0" baseline="0" noProof="0">
               <a:ln>
@@ -1845,7 +1845,7 @@
                 <a:tabLst/>
                 <a:defRPr/>
               </a:pPr>
-              <a:t>‹#›</a:t>
+              <a:t>‹N°›</a:t>
             </a:fld>
             <a:endParaRPr kumimoji="0" lang="fr-FR" sz="1200" b="0" i="0" u="none" strike="noStrike" kern="1200" cap="none" spc="0" normalizeH="0" baseline="0" noProof="0">
               <a:ln>
@@ -2099,7 +2099,7 @@
                 <a:tabLst/>
                 <a:defRPr/>
               </a:pPr>
-              <a:t>20/03/2022</a:t>
+              <a:t>05/11/2023</a:t>
             </a:fld>
             <a:endParaRPr kumimoji="0" lang="fr-FR" sz="1200" b="0" i="0" u="none" strike="noStrike" kern="1200" cap="none" spc="0" normalizeH="0" baseline="0" noProof="0">
               <a:ln>
@@ -2237,7 +2237,7 @@
                 <a:tabLst/>
                 <a:defRPr/>
               </a:pPr>
-              <a:t>‹#›</a:t>
+              <a:t>‹N°›</a:t>
             </a:fld>
             <a:endParaRPr kumimoji="0" lang="fr-FR" sz="1200" b="0" i="0" u="none" strike="noStrike" kern="1200" cap="none" spc="0" normalizeH="0" baseline="0" noProof="0">
               <a:ln>
@@ -2626,7 +2626,7 @@
                 <a:tabLst/>
                 <a:defRPr/>
               </a:pPr>
-              <a:t>20/03/2022</a:t>
+              <a:t>05/11/2023</a:t>
             </a:fld>
             <a:endParaRPr kumimoji="0" lang="fr-FR" sz="1200" b="0" i="0" u="none" strike="noStrike" kern="1200" cap="none" spc="0" normalizeH="0" baseline="0" noProof="0">
               <a:ln>
@@ -2764,7 +2764,7 @@
                 <a:tabLst/>
                 <a:defRPr/>
               </a:pPr>
-              <a:t>‹#›</a:t>
+              <a:t>‹N°›</a:t>
             </a:fld>
             <a:endParaRPr kumimoji="0" lang="fr-FR" sz="1200" b="0" i="0" u="none" strike="noStrike" kern="1200" cap="none" spc="0" normalizeH="0" baseline="0" noProof="0">
               <a:ln>
@@ -2904,7 +2904,7 @@
                 <a:tabLst/>
                 <a:defRPr/>
               </a:pPr>
-              <a:t>20/03/2022</a:t>
+              <a:t>05/11/2023</a:t>
             </a:fld>
             <a:endParaRPr kumimoji="0" lang="fr-FR" sz="1200" b="0" i="0" u="none" strike="noStrike" kern="1200" cap="none" spc="0" normalizeH="0" baseline="0" noProof="0">
               <a:ln>
@@ -3042,7 +3042,7 @@
                 <a:tabLst/>
                 <a:defRPr/>
               </a:pPr>
-              <a:t>‹#›</a:t>
+              <a:t>‹N°›</a:t>
             </a:fld>
             <a:endParaRPr kumimoji="0" lang="fr-FR" sz="1200" b="0" i="0" u="none" strike="noStrike" kern="1200" cap="none" spc="0" normalizeH="0" baseline="0" noProof="0">
               <a:ln>
@@ -3159,7 +3159,7 @@
                 <a:tabLst/>
                 <a:defRPr/>
               </a:pPr>
-              <a:t>20/03/2022</a:t>
+              <a:t>05/11/2023</a:t>
             </a:fld>
             <a:endParaRPr kumimoji="0" lang="fr-FR" sz="1200" b="0" i="0" u="none" strike="noStrike" kern="1200" cap="none" spc="0" normalizeH="0" baseline="0" noProof="0">
               <a:ln>
@@ -3297,7 +3297,7 @@
                 <a:tabLst/>
                 <a:defRPr/>
               </a:pPr>
-              <a:t>‹#›</a:t>
+              <a:t>‹N°›</a:t>
             </a:fld>
             <a:endParaRPr kumimoji="0" lang="fr-FR" sz="1200" b="0" i="0" u="none" strike="noStrike" kern="1200" cap="none" spc="0" normalizeH="0" baseline="0" noProof="0">
               <a:ln>
@@ -3596,7 +3596,7 @@
                 <a:tabLst/>
                 <a:defRPr/>
               </a:pPr>
-              <a:t>20/03/2022</a:t>
+              <a:t>05/11/2023</a:t>
             </a:fld>
             <a:endParaRPr kumimoji="0" lang="fr-FR" sz="1200" b="0" i="0" u="none" strike="noStrike" kern="1200" cap="none" spc="0" normalizeH="0" baseline="0" noProof="0">
               <a:ln>
@@ -3734,7 +3734,7 @@
                 <a:tabLst/>
                 <a:defRPr/>
               </a:pPr>
-              <a:t>‹#›</a:t>
+              <a:t>‹N°›</a:t>
             </a:fld>
             <a:endParaRPr kumimoji="0" lang="fr-FR" sz="1200" b="0" i="0" u="none" strike="noStrike" kern="1200" cap="none" spc="0" normalizeH="0" baseline="0" noProof="0">
               <a:ln>
@@ -4013,7 +4013,7 @@
                 <a:tabLst/>
                 <a:defRPr/>
               </a:pPr>
-              <a:t>20/03/2022</a:t>
+              <a:t>05/11/2023</a:t>
             </a:fld>
             <a:endParaRPr kumimoji="0" lang="fr-FR" sz="1200" b="0" i="0" u="none" strike="noStrike" kern="1200" cap="none" spc="0" normalizeH="0" baseline="0" noProof="0">
               <a:ln>
@@ -4151,7 +4151,7 @@
                 <a:tabLst/>
                 <a:defRPr/>
               </a:pPr>
-              <a:t>‹#›</a:t>
+              <a:t>‹N°›</a:t>
             </a:fld>
             <a:endParaRPr kumimoji="0" lang="fr-FR" sz="1200" b="0" i="0" u="none" strike="noStrike" kern="1200" cap="none" spc="0" normalizeH="0" baseline="0" noProof="0">
               <a:ln>
@@ -4396,7 +4396,7 @@
                 <a:tabLst/>
                 <a:defRPr/>
               </a:pPr>
-              <a:t>20/03/2022</a:t>
+              <a:t>05/11/2023</a:t>
             </a:fld>
             <a:endParaRPr kumimoji="0" lang="fr-FR" sz="1200" b="0" i="0" u="none" strike="noStrike" kern="1200" cap="none" spc="0" normalizeH="0" baseline="0" noProof="0">
               <a:ln>
@@ -4570,7 +4570,7 @@
                 <a:tabLst/>
                 <a:defRPr/>
               </a:pPr>
-              <a:t>‹#›</a:t>
+              <a:t>‹N°›</a:t>
             </a:fld>
             <a:endParaRPr kumimoji="0" lang="fr-FR" sz="1200" b="0" i="0" u="none" strike="noStrike" kern="1200" cap="none" spc="0" normalizeH="0" baseline="0" noProof="0">
               <a:ln>
@@ -4906,7 +4906,7 @@
           </a:blip>
           <a:srcRect/>
           <a:stretch>
-            <a:fillRect l="-20000" r="-30000"/>
+            <a:fillRect/>
           </a:stretch>
         </a:blipFill>
         <a:effectLst/>
@@ -4954,7 +4954,7 @@
               </a:lnSpc>
             </a:pPr>
             <a:r>
-              <a:rPr lang="fr-FR" sz="16100" baseline="30000">
+              <a:rPr lang="fr-FR" sz="16100" baseline="30000" dirty="0" err="1">
                 <a:latin typeface="Alégre Sans NC" panose="02060606060101040101" pitchFamily="18" charset="0"/>
               </a:rPr>
               <a:t>boky</a:t>

</xml_diff>

<commit_message>
feat: refactor and change split
</commit_message>
<xml_diff>
--- a/template.pptx
+++ b/template.pptx
@@ -4955,11 +4955,17 @@
             </a:pPr>
             <a:r>
               <a:rPr lang="fr-FR" sz="16100" baseline="30000" dirty="0" err="1">
+                <a:solidFill>
+                  <a:srgbClr val="FFFF00"/>
+                </a:solidFill>
                 <a:latin typeface="Alégre Sans NC" panose="02060606060101040101" pitchFamily="18" charset="0"/>
               </a:rPr>
               <a:t>boky</a:t>
             </a:r>
             <a:endParaRPr lang="fr-FR" sz="16100" baseline="30000" dirty="0">
+              <a:solidFill>
+                <a:srgbClr val="FFFF00"/>
+              </a:solidFill>
               <a:latin typeface="Alégre Sans NC" panose="02060606060101040101" pitchFamily="18" charset="0"/>
             </a:endParaRPr>
           </a:p>

</xml_diff>